<commit_message>
Several updates to the poster
</commit_message>
<xml_diff>
--- a/Poster.pptx
+++ b/Poster.pptx
@@ -4994,7 +4994,7 @@
         <p:spPr>
           <a:xfrm>
             <a:off x="410328" y="8521244"/>
-            <a:ext cx="15163800" cy="15111829"/>
+            <a:ext cx="15163800" cy="6586418"/>
           </a:xfrm>
           <a:prstGeom prst="rect">
             <a:avLst/>
@@ -5027,6 +5027,12 @@
           <a:p>
             <a:r>
               <a:rPr lang="en-US" sz="4800" dirty="0"/>
+              <a:t>   - View course location with Google Maps</a:t>
+            </a:r>
+          </a:p>
+          <a:p>
+            <a:r>
+              <a:rPr lang="en-US" sz="4800" dirty="0"/>
               <a:t> - Create and view lectures</a:t>
             </a:r>
           </a:p>
@@ -5038,37 +5044,9 @@
           </a:p>
           <a:p>
             <a:r>
-              <a:rPr lang="en-US" sz="4800"/>
-              <a:t> -</a:t>
-            </a:r>
-            <a:r>
               <a:rPr lang="en-US" sz="4800" dirty="0"/>
-              <a:t> </a:t>
-            </a:r>
-          </a:p>
-          <a:p>
-            <a:endParaRPr lang="en-US" dirty="0"/>
-          </a:p>
-          <a:p>
-            <a:endParaRPr lang="en-US" dirty="0"/>
-          </a:p>
-          <a:p>
-            <a:r>
-              <a:rPr lang="en-US" dirty="0"/>
-              <a:t>Actors and Use Cases</a:t>
-            </a:r>
-          </a:p>
-          <a:p>
-            <a:endParaRPr lang="en-US" dirty="0"/>
-          </a:p>
-          <a:p>
-            <a:endParaRPr lang="en-US" dirty="0"/>
-          </a:p>
-          <a:p>
-            <a:endParaRPr lang="en-US" dirty="0"/>
-          </a:p>
-          <a:p>
-            <a:endParaRPr lang="en-US" dirty="0" err="1"/>
+              <a:t> - Professor and student chatrooms by course</a:t>
+            </a:r>
           </a:p>
         </p:txBody>
       </p:sp>
@@ -5186,7 +5164,7 @@
         </p:nvSpPr>
         <p:spPr>
           <a:xfrm>
-            <a:off x="379848" y="27432000"/>
+            <a:off x="448428" y="28792529"/>
             <a:ext cx="15163800" cy="8032968"/>
           </a:xfrm>
           <a:prstGeom prst="rect">
@@ -5236,7 +5214,7 @@
         </p:nvSpPr>
         <p:spPr>
           <a:xfrm>
-            <a:off x="16535400" y="17273351"/>
+            <a:off x="16535400" y="27199471"/>
             <a:ext cx="15163800" cy="6709529"/>
           </a:xfrm>
           <a:prstGeom prst="rect">
@@ -5328,6 +5306,221 @@
           </a:p>
         </p:txBody>
       </p:sp>
+      <p:sp>
+        <p:nvSpPr>
+          <p:cNvPr id="12" name="TextBox 11">
+            <a:extLst>
+              <a:ext uri="{FF2B5EF4-FFF2-40B4-BE49-F238E27FC236}">
+                <a16:creationId xmlns:a16="http://schemas.microsoft.com/office/drawing/2014/main" id="{934ECC43-6289-4087-A0B1-8C4979F8ED3F}"/>
+              </a:ext>
+            </a:extLst>
+          </p:cNvPr>
+          <p:cNvSpPr txBox="1"/>
+          <p:nvPr/>
+        </p:nvSpPr>
+        <p:spPr>
+          <a:xfrm>
+            <a:off x="448428" y="15445384"/>
+            <a:ext cx="17305020" cy="12495728"/>
+          </a:xfrm>
+          <a:prstGeom prst="rect">
+            <a:avLst/>
+          </a:prstGeom>
+          <a:noFill/>
+        </p:spPr>
+        <p:txBody>
+          <a:bodyPr wrap="square" rtlCol="0">
+            <a:spAutoFit/>
+          </a:bodyPr>
+          <a:lstStyle/>
+          <a:p>
+            <a:r>
+              <a:rPr lang="en-US" dirty="0"/>
+              <a:t>Actors and Use Cases</a:t>
+            </a:r>
+          </a:p>
+          <a:p>
+            <a:r>
+              <a:rPr lang="en-US" sz="4800" dirty="0"/>
+              <a:t>Administrators</a:t>
+            </a:r>
+          </a:p>
+          <a:p>
+            <a:r>
+              <a:rPr lang="en-US" sz="4800" dirty="0"/>
+              <a:t> - Create course</a:t>
+            </a:r>
+          </a:p>
+          <a:p>
+            <a:r>
+              <a:rPr lang="en-US" sz="4800" dirty="0"/>
+              <a:t> - Enroll students and professors</a:t>
+            </a:r>
+          </a:p>
+          <a:p>
+            <a:r>
+              <a:rPr lang="en-US" sz="4800" dirty="0"/>
+              <a:t> - View all users</a:t>
+            </a:r>
+          </a:p>
+          <a:p>
+            <a:r>
+              <a:rPr lang="en-US" sz="4800" dirty="0"/>
+              <a:t>Professors</a:t>
+            </a:r>
+          </a:p>
+          <a:p>
+            <a:r>
+              <a:rPr lang="en-US" sz="4800" dirty="0"/>
+              <a:t> - Create lectures by course</a:t>
+            </a:r>
+          </a:p>
+          <a:p>
+            <a:r>
+              <a:rPr lang="en-US" sz="4800" dirty="0"/>
+              <a:t> - Assign students to seats by lecture</a:t>
+            </a:r>
+          </a:p>
+          <a:p>
+            <a:r>
+              <a:rPr lang="en-US" sz="4800" dirty="0"/>
+              <a:t> - Open/close attendance by lecture</a:t>
+            </a:r>
+          </a:p>
+          <a:p>
+            <a:r>
+              <a:rPr lang="en-US" sz="4800" dirty="0"/>
+              <a:t> - View course location on Google Maps</a:t>
+            </a:r>
+          </a:p>
+          <a:p>
+            <a:r>
+              <a:rPr lang="en-US" sz="4800" dirty="0"/>
+              <a:t> - Chat with logged-in students within the course</a:t>
+            </a:r>
+          </a:p>
+          <a:p>
+            <a:r>
+              <a:rPr lang="en-US" sz="4800" dirty="0"/>
+              <a:t>Students</a:t>
+            </a:r>
+          </a:p>
+          <a:p>
+            <a:r>
+              <a:rPr lang="en-US" sz="4800" dirty="0"/>
+              <a:t> - View lectures by course</a:t>
+            </a:r>
+          </a:p>
+          <a:p>
+            <a:r>
+              <a:rPr lang="en-US" sz="4800" dirty="0"/>
+              <a:t> - Record attendance by lecture</a:t>
+            </a:r>
+          </a:p>
+          <a:p>
+            <a:r>
+              <a:rPr lang="en-US" sz="4800" dirty="0"/>
+              <a:t> - View course location on Google Maps</a:t>
+            </a:r>
+          </a:p>
+          <a:p>
+            <a:r>
+              <a:rPr lang="en-US" sz="4800" dirty="0"/>
+              <a:t> - Chat with professor and other logged-in students within the course</a:t>
+            </a:r>
+          </a:p>
+        </p:txBody>
+      </p:sp>
+      <p:pic>
+        <p:nvPicPr>
+          <p:cNvPr id="13" name="Picture 12">
+            <a:extLst>
+              <a:ext uri="{FF2B5EF4-FFF2-40B4-BE49-F238E27FC236}">
+                <a16:creationId xmlns:a16="http://schemas.microsoft.com/office/drawing/2014/main" id="{35E383BF-8F81-479E-B05D-814F805A5443}"/>
+              </a:ext>
+            </a:extLst>
+          </p:cNvPr>
+          <p:cNvPicPr>
+            <a:picLocks noChangeAspect="1"/>
+          </p:cNvPicPr>
+          <p:nvPr/>
+        </p:nvPicPr>
+        <p:blipFill>
+          <a:blip r:embed="rId3"/>
+          <a:stretch>
+            <a:fillRect/>
+          </a:stretch>
+        </p:blipFill>
+        <p:spPr>
+          <a:xfrm>
+            <a:off x="15612228" y="10442140"/>
+            <a:ext cx="7734299" cy="5305115"/>
+          </a:xfrm>
+          <a:prstGeom prst="rect">
+            <a:avLst/>
+          </a:prstGeom>
+        </p:spPr>
+      </p:pic>
+      <p:pic>
+        <p:nvPicPr>
+          <p:cNvPr id="14" name="Picture 13">
+            <a:extLst>
+              <a:ext uri="{FF2B5EF4-FFF2-40B4-BE49-F238E27FC236}">
+                <a16:creationId xmlns:a16="http://schemas.microsoft.com/office/drawing/2014/main" id="{4894670B-1B0C-43A3-8752-509F019A5926}"/>
+              </a:ext>
+            </a:extLst>
+          </p:cNvPr>
+          <p:cNvPicPr>
+            <a:picLocks noChangeAspect="1"/>
+          </p:cNvPicPr>
+          <p:nvPr/>
+        </p:nvPicPr>
+        <p:blipFill>
+          <a:blip r:embed="rId4"/>
+          <a:stretch>
+            <a:fillRect/>
+          </a:stretch>
+        </p:blipFill>
+        <p:spPr>
+          <a:xfrm>
+            <a:off x="24568967" y="10332393"/>
+            <a:ext cx="7539808" cy="5278547"/>
+          </a:xfrm>
+          <a:prstGeom prst="rect">
+            <a:avLst/>
+          </a:prstGeom>
+        </p:spPr>
+      </p:pic>
+      <p:pic>
+        <p:nvPicPr>
+          <p:cNvPr id="15" name="Picture 14">
+            <a:extLst>
+              <a:ext uri="{FF2B5EF4-FFF2-40B4-BE49-F238E27FC236}">
+                <a16:creationId xmlns:a16="http://schemas.microsoft.com/office/drawing/2014/main" id="{D6AAA830-283F-4FF7-9A43-9A96AECE4CE7}"/>
+              </a:ext>
+            </a:extLst>
+          </p:cNvPr>
+          <p:cNvPicPr>
+            <a:picLocks noChangeAspect="1"/>
+          </p:cNvPicPr>
+          <p:nvPr/>
+        </p:nvPicPr>
+        <p:blipFill>
+          <a:blip r:embed="rId5"/>
+          <a:stretch>
+            <a:fillRect/>
+          </a:stretch>
+        </p:blipFill>
+        <p:spPr>
+          <a:xfrm>
+            <a:off x="15574128" y="16566061"/>
+            <a:ext cx="7772399" cy="5964588"/>
+          </a:xfrm>
+          <a:prstGeom prst="rect">
+            <a:avLst/>
+          </a:prstGeom>
+        </p:spPr>
+      </p:pic>
     </p:spTree>
     <p:extLst>
       <p:ext uri="{BB962C8B-B14F-4D97-AF65-F5344CB8AC3E}">

</xml_diff>